<commit_message>
Update runtime to ravenscar-full-stm32f4 + Add utils
</commit_message>
<xml_diff>
--- a/doc/manual/fig/figures.pptx
+++ b/doc/manual/fig/figures.pptx
@@ -7,6 +7,7 @@
   <p:sldIdLst>
     <p:sldId id="256" r:id="rId2"/>
     <p:sldId id="257" r:id="rId3"/>
+    <p:sldId id="258" r:id="rId4"/>
   </p:sldIdLst>
   <p:sldSz cx="12192000" cy="6858000"/>
   <p:notesSz cx="6858000" cy="9144000"/>
@@ -105,6 +106,11 @@
       </a:defRPr>
     </a:lvl9pPr>
   </p:defaultTextStyle>
+  <p:extLst>
+    <p:ext uri="{EFAFB233-063F-42B5-8137-9DF3F51BA10A}">
+      <p15:sldGuideLst xmlns:p15="http://schemas.microsoft.com/office/powerpoint/2012/main"/>
+    </p:ext>
+  </p:extLst>
 </p:presentation>
 </file>
 
@@ -5518,6 +5524,214 @@
 </p:sld>
 </file>
 
+<file path=ppt/slides/slide3.xml><?xml version="1.0" encoding="utf-8"?>
+<p:sld xmlns:a="http://schemas.openxmlformats.org/drawingml/2006/main" xmlns:r="http://schemas.openxmlformats.org/officeDocument/2006/relationships" xmlns:p="http://schemas.openxmlformats.org/presentationml/2006/main">
+  <p:cSld>
+    <p:spTree>
+      <p:nvGrpSpPr>
+        <p:cNvPr id="1" name=""/>
+        <p:cNvGrpSpPr/>
+        <p:nvPr/>
+      </p:nvGrpSpPr>
+      <p:grpSpPr>
+        <a:xfrm>
+          <a:off x="0" y="0"/>
+          <a:ext cx="0" cy="0"/>
+          <a:chOff x="0" y="0"/>
+          <a:chExt cx="0" cy="0"/>
+        </a:xfrm>
+      </p:grpSpPr>
+      <p:pic>
+        <p:nvPicPr>
+          <p:cNvPr id="5" name="Imagen 4" descr="Imagen que contiene electrónica, circuito&#10;&#10;Descripción generada automáticamente">
+            <a:extLst>
+              <a:ext uri="{FF2B5EF4-FFF2-40B4-BE49-F238E27FC236}">
+                <a16:creationId xmlns:a16="http://schemas.microsoft.com/office/drawing/2014/main" id="{F195DE16-7946-8F50-0535-E714417C8D64}"/>
+              </a:ext>
+            </a:extLst>
+          </p:cNvPr>
+          <p:cNvPicPr>
+            <a:picLocks noChangeAspect="1"/>
+          </p:cNvPicPr>
+          <p:nvPr/>
+        </p:nvPicPr>
+        <p:blipFill rotWithShape="1">
+          <a:blip r:embed="rId2">
+            <a:extLst>
+              <a:ext uri="{28A0092B-C50C-407E-A947-70E740481C1C}">
+                <a14:useLocalDpi xmlns:a14="http://schemas.microsoft.com/office/drawing/2010/main" val="0"/>
+              </a:ext>
+            </a:extLst>
+          </a:blip>
+          <a:srcRect r="2362"/>
+          <a:stretch/>
+        </p:blipFill>
+        <p:spPr>
+          <a:xfrm rot="16200000">
+            <a:off x="2793590" y="1320541"/>
+            <a:ext cx="6604820" cy="4376692"/>
+          </a:xfrm>
+          <a:prstGeom prst="rect">
+            <a:avLst/>
+          </a:prstGeom>
+        </p:spPr>
+      </p:pic>
+      <p:sp>
+        <p:nvSpPr>
+          <p:cNvPr id="7" name="CuadroTexto 6">
+            <a:extLst>
+              <a:ext uri="{FF2B5EF4-FFF2-40B4-BE49-F238E27FC236}">
+                <a16:creationId xmlns:a16="http://schemas.microsoft.com/office/drawing/2014/main" id="{0E8ACEE9-B90B-39B2-A070-85F48F88B70C}"/>
+              </a:ext>
+            </a:extLst>
+          </p:cNvPr>
+          <p:cNvSpPr txBox="1"/>
+          <p:nvPr/>
+        </p:nvSpPr>
+        <p:spPr>
+          <a:xfrm>
+            <a:off x="8284347" y="4067294"/>
+            <a:ext cx="1596254" cy="369332"/>
+          </a:xfrm>
+          <a:prstGeom prst="rect">
+            <a:avLst/>
+          </a:prstGeom>
+          <a:noFill/>
+          <a:ln w="28575">
+            <a:solidFill>
+              <a:srgbClr val="126949"/>
+            </a:solidFill>
+          </a:ln>
+        </p:spPr>
+        <p:txBody>
+          <a:bodyPr wrap="square" rtlCol="0">
+            <a:spAutoFit/>
+          </a:bodyPr>
+          <a:lstStyle/>
+          <a:p>
+            <a:r>
+              <a:rPr lang="en-US" dirty="0">
+                <a:solidFill>
+                  <a:schemeClr val="tx2">
+                    <a:lumMod val="75000"/>
+                  </a:schemeClr>
+                </a:solidFill>
+              </a:rPr>
+              <a:t>Pins PB6 &amp; PB7</a:t>
+            </a:r>
+          </a:p>
+        </p:txBody>
+      </p:sp>
+      <p:cxnSp>
+        <p:nvCxnSpPr>
+          <p:cNvPr id="9" name="Conector recto 8">
+            <a:extLst>
+              <a:ext uri="{FF2B5EF4-FFF2-40B4-BE49-F238E27FC236}">
+                <a16:creationId xmlns:a16="http://schemas.microsoft.com/office/drawing/2014/main" id="{6E97C78D-63DB-5326-3295-77C454FFBF40}"/>
+              </a:ext>
+            </a:extLst>
+          </p:cNvPr>
+          <p:cNvCxnSpPr>
+            <a:cxnSpLocks/>
+            <a:stCxn id="6" idx="3"/>
+            <a:endCxn id="7" idx="1"/>
+          </p:cNvCxnSpPr>
+          <p:nvPr/>
+        </p:nvCxnSpPr>
+        <p:spPr>
+          <a:xfrm>
+            <a:off x="8092440" y="4251960"/>
+            <a:ext cx="191907" cy="0"/>
+          </a:xfrm>
+          <a:prstGeom prst="line">
+            <a:avLst/>
+          </a:prstGeom>
+          <a:ln w="28575">
+            <a:solidFill>
+              <a:srgbClr val="126949"/>
+            </a:solidFill>
+          </a:ln>
+        </p:spPr>
+        <p:style>
+          <a:lnRef idx="1">
+            <a:schemeClr val="accent1"/>
+          </a:lnRef>
+          <a:fillRef idx="0">
+            <a:schemeClr val="accent1"/>
+          </a:fillRef>
+          <a:effectRef idx="0">
+            <a:schemeClr val="accent1"/>
+          </a:effectRef>
+          <a:fontRef idx="minor">
+            <a:schemeClr val="tx1"/>
+          </a:fontRef>
+        </p:style>
+      </p:cxnSp>
+      <p:sp>
+        <p:nvSpPr>
+          <p:cNvPr id="6" name="Rectángulo 5">
+            <a:extLst>
+              <a:ext uri="{FF2B5EF4-FFF2-40B4-BE49-F238E27FC236}">
+                <a16:creationId xmlns:a16="http://schemas.microsoft.com/office/drawing/2014/main" id="{44947F26-B3A5-C793-F49F-BCA2368E42C7}"/>
+              </a:ext>
+            </a:extLst>
+          </p:cNvPr>
+          <p:cNvSpPr/>
+          <p:nvPr/>
+        </p:nvSpPr>
+        <p:spPr>
+          <a:xfrm>
+            <a:off x="7231379" y="4166235"/>
+            <a:ext cx="861061" cy="171450"/>
+          </a:xfrm>
+          <a:prstGeom prst="rect">
+            <a:avLst/>
+          </a:prstGeom>
+          <a:noFill/>
+          <a:ln w="38100">
+            <a:solidFill>
+              <a:srgbClr val="F4EE00"/>
+            </a:solidFill>
+          </a:ln>
+        </p:spPr>
+        <p:style>
+          <a:lnRef idx="2">
+            <a:schemeClr val="accent1">
+              <a:shade val="15000"/>
+            </a:schemeClr>
+          </a:lnRef>
+          <a:fillRef idx="1">
+            <a:schemeClr val="accent1"/>
+          </a:fillRef>
+          <a:effectRef idx="0">
+            <a:schemeClr val="accent1"/>
+          </a:effectRef>
+          <a:fontRef idx="minor">
+            <a:schemeClr val="lt1"/>
+          </a:fontRef>
+        </p:style>
+        <p:txBody>
+          <a:bodyPr rtlCol="0" anchor="ctr"/>
+          <a:lstStyle/>
+          <a:p>
+            <a:pPr algn="ctr"/>
+            <a:endParaRPr lang="en-US"/>
+          </a:p>
+        </p:txBody>
+      </p:sp>
+    </p:spTree>
+    <p:extLst>
+      <p:ext uri="{BB962C8B-B14F-4D97-AF65-F5344CB8AC3E}">
+        <p14:creationId xmlns:p14="http://schemas.microsoft.com/office/powerpoint/2010/main" val="243261695"/>
+      </p:ext>
+    </p:extLst>
+  </p:cSld>
+  <p:clrMapOvr>
+    <a:masterClrMapping/>
+  </p:clrMapOvr>
+</p:sld>
+</file>
+
 <file path=ppt/theme/theme1.xml><?xml version="1.0" encoding="utf-8"?>
 <a:theme xmlns:a="http://schemas.openxmlformats.org/drawingml/2006/main" name="Tema de Office">
   <a:themeElements>

</xml_diff>